<commit_message>
started on report tex.
</commit_message>
<xml_diff>
--- a/presentation/presentation.pptx
+++ b/presentation/presentation.pptx
@@ -3979,6 +3979,12 @@
           </a:p>
           <a:p>
             <a:r>
+              <a:rPr lang="en-US" dirty="0" smtClean="0"/>
+              <a:t>Classification data set (n=300)</a:t>
+            </a:r>
+          </a:p>
+          <a:p>
+            <a:r>
               <a:rPr lang="en-US" dirty="0" smtClean="0">
                 <a:solidFill>
                   <a:srgbClr val="FF0000"/>
@@ -4466,6 +4472,35 @@
               <a:rPr lang="en-US" dirty="0" smtClean="0"/>
               <a:t>Focus on software based devices</a:t>
             </a:r>
+          </a:p>
+          <a:p>
+            <a:pPr lvl="1"/>
+            <a:r>
+              <a:rPr lang="en-US" dirty="0" smtClean="0"/>
+              <a:t>Jens Weber</a:t>
+            </a:r>
+          </a:p>
+          <a:p>
+            <a:pPr lvl="1"/>
+            <a:r>
+              <a:rPr lang="en-US" dirty="0" err="1" smtClean="0"/>
+              <a:t>Fieran</a:t>
+            </a:r>
+            <a:r>
+              <a:rPr lang="en-US" dirty="0" smtClean="0"/>
+              <a:t> Mason-Blakely</a:t>
+            </a:r>
+          </a:p>
+          <a:p>
+            <a:pPr lvl="1"/>
+            <a:r>
+              <a:rPr lang="en-US" dirty="0" smtClean="0"/>
+              <a:t>Ryan </a:t>
+            </a:r>
+            <a:r>
+              <a:rPr lang="en-US" dirty="0" err="1" smtClean="0"/>
+              <a:t>Habibi</a:t>
+            </a:r>
             <a:endParaRPr lang="en-US" dirty="0"/>
           </a:p>
         </p:txBody>
@@ -4492,8 +4527,8 @@
         </p:blipFill>
         <p:spPr>
           <a:xfrm>
-            <a:off x="4474448" y="2516388"/>
-            <a:ext cx="4950724" cy="4257228"/>
+            <a:off x="4537990" y="2703865"/>
+            <a:ext cx="4352522" cy="3742822"/>
           </a:xfrm>
           <a:prstGeom prst="rect">
             <a:avLst/>

</xml_diff>

<commit_message>
Included my part of the presentation.
</commit_message>
<xml_diff>
--- a/presentation/presentation.pptx
+++ b/presentation/presentation.pptx
@@ -117,6 +117,22 @@
       </a:defRPr>
     </a:lvl9pPr>
   </p:defaultTextStyle>
+  <p:extLst>
+    <p:ext uri="{EFAFB233-063F-42B5-8137-9DF3F51BA10A}">
+      <p15:sldGuideLst xmlns:p15="http://schemas.microsoft.com/office/powerpoint/2012/main">
+        <p15:guide id="1" orient="horz" pos="2160">
+          <p15:clr>
+            <a:srgbClr val="A4A3A4"/>
+          </p15:clr>
+        </p15:guide>
+        <p15:guide id="2" pos="2880">
+          <p15:clr>
+            <a:srgbClr val="A4A3A4"/>
+          </p15:clr>
+        </p15:guide>
+      </p15:sldGuideLst>
+    </p:ext>
+  </p:extLst>
 </p:presentation>
 </file>
 
@@ -301,7 +317,7 @@
           <a:p>
             <a:fld id="{A83E17D2-DDD4-D24A-B9A3-148B5AC98B80}" type="datetimeFigureOut">
               <a:rPr lang="en-US" smtClean="0"/>
-              <a:t>15-03-23</a:t>
+              <a:t>3/24/15</a:t>
             </a:fld>
             <a:endParaRPr lang="en-US"/>
           </a:p>
@@ -471,7 +487,7 @@
           <a:p>
             <a:fld id="{A83E17D2-DDD4-D24A-B9A3-148B5AC98B80}" type="datetimeFigureOut">
               <a:rPr lang="en-US" smtClean="0"/>
-              <a:t>15-03-23</a:t>
+              <a:t>3/24/15</a:t>
             </a:fld>
             <a:endParaRPr lang="en-US"/>
           </a:p>
@@ -651,7 +667,7 @@
           <a:p>
             <a:fld id="{A83E17D2-DDD4-D24A-B9A3-148B5AC98B80}" type="datetimeFigureOut">
               <a:rPr lang="en-US" smtClean="0"/>
-              <a:t>15-03-23</a:t>
+              <a:t>3/24/15</a:t>
             </a:fld>
             <a:endParaRPr lang="en-US"/>
           </a:p>
@@ -821,7 +837,7 @@
           <a:p>
             <a:fld id="{A83E17D2-DDD4-D24A-B9A3-148B5AC98B80}" type="datetimeFigureOut">
               <a:rPr lang="en-US" smtClean="0"/>
-              <a:t>15-03-23</a:t>
+              <a:t>3/24/15</a:t>
             </a:fld>
             <a:endParaRPr lang="en-US"/>
           </a:p>
@@ -1067,7 +1083,7 @@
           <a:p>
             <a:fld id="{A83E17D2-DDD4-D24A-B9A3-148B5AC98B80}" type="datetimeFigureOut">
               <a:rPr lang="en-US" smtClean="0"/>
-              <a:t>15-03-23</a:t>
+              <a:t>3/24/15</a:t>
             </a:fld>
             <a:endParaRPr lang="en-US"/>
           </a:p>
@@ -1355,7 +1371,7 @@
           <a:p>
             <a:fld id="{A83E17D2-DDD4-D24A-B9A3-148B5AC98B80}" type="datetimeFigureOut">
               <a:rPr lang="en-US" smtClean="0"/>
-              <a:t>15-03-23</a:t>
+              <a:t>3/24/15</a:t>
             </a:fld>
             <a:endParaRPr lang="en-US"/>
           </a:p>
@@ -1777,7 +1793,7 @@
           <a:p>
             <a:fld id="{A83E17D2-DDD4-D24A-B9A3-148B5AC98B80}" type="datetimeFigureOut">
               <a:rPr lang="en-US" smtClean="0"/>
-              <a:t>15-03-23</a:t>
+              <a:t>3/24/15</a:t>
             </a:fld>
             <a:endParaRPr lang="en-US"/>
           </a:p>
@@ -1895,7 +1911,7 @@
           <a:p>
             <a:fld id="{A83E17D2-DDD4-D24A-B9A3-148B5AC98B80}" type="datetimeFigureOut">
               <a:rPr lang="en-US" smtClean="0"/>
-              <a:t>15-03-23</a:t>
+              <a:t>3/24/15</a:t>
             </a:fld>
             <a:endParaRPr lang="en-US"/>
           </a:p>
@@ -1990,7 +2006,7 @@
           <a:p>
             <a:fld id="{A83E17D2-DDD4-D24A-B9A3-148B5AC98B80}" type="datetimeFigureOut">
               <a:rPr lang="en-US" smtClean="0"/>
-              <a:t>15-03-23</a:t>
+              <a:t>3/24/15</a:t>
             </a:fld>
             <a:endParaRPr lang="en-US"/>
           </a:p>
@@ -2267,7 +2283,7 @@
           <a:p>
             <a:fld id="{A83E17D2-DDD4-D24A-B9A3-148B5AC98B80}" type="datetimeFigureOut">
               <a:rPr lang="en-US" smtClean="0"/>
-              <a:t>15-03-23</a:t>
+              <a:t>3/24/15</a:t>
             </a:fld>
             <a:endParaRPr lang="en-US"/>
           </a:p>
@@ -2520,7 +2536,7 @@
           <a:p>
             <a:fld id="{A83E17D2-DDD4-D24A-B9A3-148B5AC98B80}" type="datetimeFigureOut">
               <a:rPr lang="en-US" smtClean="0"/>
-              <a:t>15-03-23</a:t>
+              <a:t>3/24/15</a:t>
             </a:fld>
             <a:endParaRPr lang="en-US"/>
           </a:p>
@@ -2733,7 +2749,7 @@
           <a:p>
             <a:fld id="{A83E17D2-DDD4-D24A-B9A3-148B5AC98B80}" type="datetimeFigureOut">
               <a:rPr lang="en-US" smtClean="0"/>
-              <a:t>15-03-23</a:t>
+              <a:t>3/24/15</a:t>
             </a:fld>
             <a:endParaRPr lang="en-US"/>
           </a:p>
@@ -3247,37 +3263,496 @@
           </a:p>
         </p:txBody>
       </p:sp>
-      <p:sp>
-        <p:nvSpPr>
-          <p:cNvPr id="3" name="Content Placeholder 2"/>
-          <p:cNvSpPr>
-            <a:spLocks noGrp="1"/>
-          </p:cNvSpPr>
+      <p:graphicFrame>
+        <p:nvGraphicFramePr>
+          <p:cNvPr id="6" name="Content Placeholder 4"/>
+          <p:cNvGraphicFramePr>
+            <a:graphicFrameLocks noGrp="1"/>
+          </p:cNvGraphicFramePr>
           <p:nvPr>
             <p:ph idx="1"/>
-          </p:nvPr>
-        </p:nvSpPr>
-        <p:spPr/>
-        <p:txBody>
-          <a:bodyPr/>
-          <a:lstStyle/>
-          <a:p>
-            <a:r>
-              <a:rPr lang="en-US" dirty="0" smtClean="0">
-                <a:solidFill>
-                  <a:srgbClr val="FF0000"/>
-                </a:solidFill>
-              </a:rPr>
-              <a:t>FILL ME!</a:t>
-            </a:r>
-            <a:endParaRPr lang="en-US" dirty="0">
-              <a:solidFill>
-                <a:srgbClr val="FF0000"/>
-              </a:solidFill>
-            </a:endParaRPr>
-          </a:p>
-        </p:txBody>
-      </p:sp>
+            <p:extLst>
+              <p:ext uri="{D42A27DB-BD31-4B8C-83A1-F6EECF244321}">
+                <p14:modId xmlns:p14="http://schemas.microsoft.com/office/powerpoint/2010/main" val="999416032"/>
+              </p:ext>
+            </p:extLst>
+          </p:nvPr>
+        </p:nvGraphicFramePr>
+        <p:xfrm>
+          <a:off x="457200" y="2103120"/>
+          <a:ext cx="8229600" cy="3703320"/>
+        </p:xfrm>
+        <a:graphic>
+          <a:graphicData uri="http://schemas.openxmlformats.org/drawingml/2006/table">
+            <a:tbl>
+              <a:tblPr firstRow="1" bandRow="1">
+                <a:tableStyleId>{5C22544A-7EE6-4342-B048-85BDC9FD1C3A}</a:tableStyleId>
+              </a:tblPr>
+              <a:tblGrid>
+                <a:gridCol w="2383971"/>
+                <a:gridCol w="3102429"/>
+                <a:gridCol w="2743200"/>
+              </a:tblGrid>
+              <a:tr h="0">
+                <a:tc>
+                  <a:txBody>
+                    <a:bodyPr/>
+                    <a:lstStyle/>
+                    <a:p>
+                      <a:r>
+                        <a:rPr lang="en-US" dirty="0" smtClean="0"/>
+                        <a:t>Class</a:t>
+                      </a:r>
+                      <a:endParaRPr lang="en-US" dirty="0"/>
+                    </a:p>
+                  </a:txBody>
+                  <a:tcPr/>
+                </a:tc>
+                <a:tc>
+                  <a:txBody>
+                    <a:bodyPr/>
+                    <a:lstStyle/>
+                    <a:p>
+                      <a:r>
+                        <a:rPr lang="en-US" dirty="0" smtClean="0"/>
+                        <a:t>Correctly</a:t>
+                      </a:r>
+                      <a:r>
+                        <a:rPr lang="en-US" baseline="0" dirty="0" smtClean="0"/>
+                        <a:t> classified instances</a:t>
+                      </a:r>
+                      <a:endParaRPr lang="en-US" dirty="0"/>
+                    </a:p>
+                  </a:txBody>
+                  <a:tcPr/>
+                </a:tc>
+                <a:tc>
+                  <a:txBody>
+                    <a:bodyPr/>
+                    <a:lstStyle/>
+                    <a:p>
+                      <a:r>
+                        <a:rPr lang="en-US" dirty="0" smtClean="0"/>
+                        <a:t>F-Measure (weighted</a:t>
+                      </a:r>
+                      <a:r>
+                        <a:rPr lang="en-US" baseline="0" dirty="0" smtClean="0"/>
+                        <a:t> avg.)</a:t>
+                      </a:r>
+                      <a:endParaRPr lang="en-US" dirty="0"/>
+                    </a:p>
+                  </a:txBody>
+                  <a:tcPr/>
+                </a:tc>
+              </a:tr>
+              <a:tr h="370840">
+                <a:tc>
+                  <a:txBody>
+                    <a:bodyPr/>
+                    <a:lstStyle/>
+                    <a:p>
+                      <a:r>
+                        <a:rPr lang="en-US" dirty="0" err="1" smtClean="0"/>
+                        <a:t>CareProvider</a:t>
+                      </a:r>
+                      <a:endParaRPr lang="en-US" dirty="0"/>
+                    </a:p>
+                  </a:txBody>
+                  <a:tcPr/>
+                </a:tc>
+                <a:tc>
+                  <a:txBody>
+                    <a:bodyPr/>
+                    <a:lstStyle/>
+                    <a:p>
+                      <a:r>
+                        <a:rPr lang="en-US" dirty="0" smtClean="0"/>
+                        <a:t>85.94%</a:t>
+                      </a:r>
+                      <a:endParaRPr lang="en-US" dirty="0"/>
+                    </a:p>
+                  </a:txBody>
+                  <a:tcPr/>
+                </a:tc>
+                <a:tc>
+                  <a:txBody>
+                    <a:bodyPr/>
+                    <a:lstStyle/>
+                    <a:p>
+                      <a:r>
+                        <a:rPr lang="en-US" dirty="0" smtClean="0"/>
+                        <a:t>0.88</a:t>
+                      </a:r>
+                      <a:endParaRPr lang="en-US" dirty="0"/>
+                    </a:p>
+                  </a:txBody>
+                  <a:tcPr/>
+                </a:tc>
+              </a:tr>
+              <a:tr h="370840">
+                <a:tc>
+                  <a:txBody>
+                    <a:bodyPr/>
+                    <a:lstStyle/>
+                    <a:p>
+                      <a:r>
+                        <a:rPr lang="en-US" dirty="0" smtClean="0"/>
+                        <a:t>EMR</a:t>
+                      </a:r>
+                      <a:endParaRPr lang="en-US" dirty="0"/>
+                    </a:p>
+                  </a:txBody>
+                  <a:tcPr/>
+                </a:tc>
+                <a:tc>
+                  <a:txBody>
+                    <a:bodyPr/>
+                    <a:lstStyle/>
+                    <a:p>
+                      <a:r>
+                        <a:rPr lang="en-US" dirty="0" smtClean="0"/>
+                        <a:t>74.61</a:t>
+                      </a:r>
+                      <a:r>
+                        <a:rPr lang="en-US" baseline="0" dirty="0" smtClean="0"/>
+                        <a:t>%</a:t>
+                      </a:r>
+                      <a:endParaRPr lang="en-US" dirty="0"/>
+                    </a:p>
+                  </a:txBody>
+                  <a:tcPr/>
+                </a:tc>
+                <a:tc>
+                  <a:txBody>
+                    <a:bodyPr/>
+                    <a:lstStyle/>
+                    <a:p>
+                      <a:r>
+                        <a:rPr lang="en-US" dirty="0" smtClean="0"/>
+                        <a:t>0.771</a:t>
+                      </a:r>
+                      <a:endParaRPr lang="en-US" dirty="0"/>
+                    </a:p>
+                  </a:txBody>
+                  <a:tcPr/>
+                </a:tc>
+              </a:tr>
+              <a:tr h="370840">
+                <a:tc>
+                  <a:txBody>
+                    <a:bodyPr/>
+                    <a:lstStyle/>
+                    <a:p>
+                      <a:r>
+                        <a:rPr lang="en-US" dirty="0" err="1" smtClean="0"/>
+                        <a:t>HealthCareProcess</a:t>
+                      </a:r>
+                      <a:endParaRPr lang="en-US" dirty="0"/>
+                    </a:p>
+                  </a:txBody>
+                  <a:tcPr/>
+                </a:tc>
+                <a:tc>
+                  <a:txBody>
+                    <a:bodyPr/>
+                    <a:lstStyle/>
+                    <a:p>
+                      <a:r>
+                        <a:rPr lang="en-US" dirty="0" smtClean="0"/>
+                        <a:t>76.95</a:t>
+                      </a:r>
+                      <a:r>
+                        <a:rPr lang="en-US" baseline="0" dirty="0" smtClean="0"/>
+                        <a:t>%</a:t>
+                      </a:r>
+                      <a:endParaRPr lang="en-US" dirty="0"/>
+                    </a:p>
+                  </a:txBody>
+                  <a:tcPr/>
+                </a:tc>
+                <a:tc>
+                  <a:txBody>
+                    <a:bodyPr/>
+                    <a:lstStyle/>
+                    <a:p>
+                      <a:r>
+                        <a:rPr lang="en-US" dirty="0" smtClean="0"/>
+                        <a:t>0.768</a:t>
+                      </a:r>
+                      <a:endParaRPr lang="en-US" dirty="0"/>
+                    </a:p>
+                  </a:txBody>
+                  <a:tcPr/>
+                </a:tc>
+              </a:tr>
+              <a:tr h="370840">
+                <a:tc>
+                  <a:txBody>
+                    <a:bodyPr/>
+                    <a:lstStyle/>
+                    <a:p>
+                      <a:r>
+                        <a:rPr lang="en-US" dirty="0" smtClean="0"/>
+                        <a:t>MDDS</a:t>
+                      </a:r>
+                      <a:endParaRPr lang="en-US" dirty="0"/>
+                    </a:p>
+                  </a:txBody>
+                  <a:tcPr/>
+                </a:tc>
+                <a:tc>
+                  <a:txBody>
+                    <a:bodyPr/>
+                    <a:lstStyle/>
+                    <a:p>
+                      <a:r>
+                        <a:rPr lang="en-US" dirty="0" smtClean="0"/>
+                        <a:t>76.95%</a:t>
+                      </a:r>
+                      <a:endParaRPr lang="en-US" dirty="0"/>
+                    </a:p>
+                  </a:txBody>
+                  <a:tcPr/>
+                </a:tc>
+                <a:tc>
+                  <a:txBody>
+                    <a:bodyPr/>
+                    <a:lstStyle/>
+                    <a:p>
+                      <a:r>
+                        <a:rPr lang="en-US" dirty="0" smtClean="0"/>
+                        <a:t>0.799</a:t>
+                      </a:r>
+                      <a:endParaRPr lang="en-US" dirty="0"/>
+                    </a:p>
+                  </a:txBody>
+                  <a:tcPr/>
+                </a:tc>
+              </a:tr>
+              <a:tr h="370840">
+                <a:tc>
+                  <a:txBody>
+                    <a:bodyPr/>
+                    <a:lstStyle/>
+                    <a:p>
+                      <a:r>
+                        <a:rPr lang="en-US" dirty="0" err="1" smtClean="0"/>
+                        <a:t>PointOfCareActuator</a:t>
+                      </a:r>
+                      <a:endParaRPr lang="en-US" dirty="0"/>
+                    </a:p>
+                  </a:txBody>
+                  <a:tcPr/>
+                </a:tc>
+                <a:tc>
+                  <a:txBody>
+                    <a:bodyPr/>
+                    <a:lstStyle/>
+                    <a:p>
+                      <a:r>
+                        <a:rPr lang="en-US" dirty="0" smtClean="0"/>
+                        <a:t>56.25%</a:t>
+                      </a:r>
+                      <a:endParaRPr lang="en-US" dirty="0"/>
+                    </a:p>
+                  </a:txBody>
+                  <a:tcPr/>
+                </a:tc>
+                <a:tc>
+                  <a:txBody>
+                    <a:bodyPr/>
+                    <a:lstStyle/>
+                    <a:p>
+                      <a:r>
+                        <a:rPr lang="en-US" dirty="0" smtClean="0"/>
+                        <a:t>0.546</a:t>
+                      </a:r>
+                      <a:endParaRPr lang="en-US" dirty="0"/>
+                    </a:p>
+                  </a:txBody>
+                  <a:tcPr/>
+                </a:tc>
+              </a:tr>
+              <a:tr h="370840">
+                <a:tc>
+                  <a:txBody>
+                    <a:bodyPr/>
+                    <a:lstStyle/>
+                    <a:p>
+                      <a:r>
+                        <a:rPr lang="en-US" dirty="0" err="1" smtClean="0"/>
+                        <a:t>PointOfCareSensor</a:t>
+                      </a:r>
+                      <a:endParaRPr lang="en-US" dirty="0"/>
+                    </a:p>
+                  </a:txBody>
+                  <a:tcPr/>
+                </a:tc>
+                <a:tc>
+                  <a:txBody>
+                    <a:bodyPr/>
+                    <a:lstStyle/>
+                    <a:p>
+                      <a:r>
+                        <a:rPr lang="en-US" dirty="0" smtClean="0"/>
+                        <a:t>58.98%</a:t>
+                      </a:r>
+                      <a:endParaRPr lang="en-US" dirty="0"/>
+                    </a:p>
+                  </a:txBody>
+                  <a:tcPr/>
+                </a:tc>
+                <a:tc>
+                  <a:txBody>
+                    <a:bodyPr/>
+                    <a:lstStyle/>
+                    <a:p>
+                      <a:r>
+                        <a:rPr lang="en-US" dirty="0" smtClean="0"/>
+                        <a:t>0.621</a:t>
+                      </a:r>
+                      <a:endParaRPr lang="en-US" dirty="0"/>
+                    </a:p>
+                  </a:txBody>
+                  <a:tcPr/>
+                </a:tc>
+              </a:tr>
+              <a:tr h="370840">
+                <a:tc>
+                  <a:txBody>
+                    <a:bodyPr/>
+                    <a:lstStyle/>
+                    <a:p>
+                      <a:r>
+                        <a:rPr lang="en-US" dirty="0" err="1" smtClean="0"/>
+                        <a:t>PointOfDecisionControl</a:t>
+                      </a:r>
+                      <a:endParaRPr lang="en-US" dirty="0"/>
+                    </a:p>
+                  </a:txBody>
+                  <a:tcPr/>
+                </a:tc>
+                <a:tc>
+                  <a:txBody>
+                    <a:bodyPr/>
+                    <a:lstStyle/>
+                    <a:p>
+                      <a:r>
+                        <a:rPr lang="en-US" dirty="0" smtClean="0"/>
+                        <a:t>67.58%</a:t>
+                      </a:r>
+                      <a:endParaRPr lang="en-US" dirty="0"/>
+                    </a:p>
+                  </a:txBody>
+                  <a:tcPr/>
+                </a:tc>
+                <a:tc>
+                  <a:txBody>
+                    <a:bodyPr/>
+                    <a:lstStyle/>
+                    <a:p>
+                      <a:r>
+                        <a:rPr lang="en-US" dirty="0" smtClean="0"/>
+                        <a:t>0.679</a:t>
+                      </a:r>
+                      <a:endParaRPr lang="en-US" dirty="0"/>
+                    </a:p>
+                  </a:txBody>
+                  <a:tcPr/>
+                </a:tc>
+              </a:tr>
+              <a:tr h="370840">
+                <a:tc>
+                  <a:txBody>
+                    <a:bodyPr/>
+                    <a:lstStyle/>
+                    <a:p>
+                      <a:r>
+                        <a:rPr lang="en-US" dirty="0" err="1" smtClean="0"/>
+                        <a:t>PointOfDecisionDisplay</a:t>
+                      </a:r>
+                      <a:endParaRPr lang="en-US" dirty="0"/>
+                    </a:p>
+                  </a:txBody>
+                  <a:tcPr/>
+                </a:tc>
+                <a:tc>
+                  <a:txBody>
+                    <a:bodyPr/>
+                    <a:lstStyle/>
+                    <a:p>
+                      <a:r>
+                        <a:rPr lang="en-US" dirty="0" smtClean="0"/>
+                        <a:t>61.72%</a:t>
+                      </a:r>
+                      <a:endParaRPr lang="en-US" dirty="0"/>
+                    </a:p>
+                  </a:txBody>
+                  <a:tcPr/>
+                </a:tc>
+                <a:tc>
+                  <a:txBody>
+                    <a:bodyPr/>
+                    <a:lstStyle/>
+                    <a:p>
+                      <a:r>
+                        <a:rPr lang="en-US" dirty="0" smtClean="0"/>
+                        <a:t>0.611</a:t>
+                      </a:r>
+                      <a:endParaRPr lang="en-US" dirty="0"/>
+                    </a:p>
+                  </a:txBody>
+                  <a:tcPr/>
+                </a:tc>
+              </a:tr>
+              <a:tr h="370840">
+                <a:tc>
+                  <a:txBody>
+                    <a:bodyPr/>
+                    <a:lstStyle/>
+                    <a:p>
+                      <a:r>
+                        <a:rPr lang="en-US" dirty="0" err="1" smtClean="0"/>
+                        <a:t>TechnicalProcess</a:t>
+                      </a:r>
+                      <a:endParaRPr lang="en-US" dirty="0"/>
+                    </a:p>
+                  </a:txBody>
+                  <a:tcPr/>
+                </a:tc>
+                <a:tc>
+                  <a:txBody>
+                    <a:bodyPr/>
+                    <a:lstStyle/>
+                    <a:p>
+                      <a:r>
+                        <a:rPr lang="en-US" dirty="0" smtClean="0"/>
+                        <a:t>78.12%</a:t>
+                      </a:r>
+                      <a:endParaRPr lang="en-US" dirty="0"/>
+                    </a:p>
+                  </a:txBody>
+                  <a:tcPr/>
+                </a:tc>
+                <a:tc>
+                  <a:txBody>
+                    <a:bodyPr/>
+                    <a:lstStyle/>
+                    <a:p>
+                      <a:r>
+                        <a:rPr lang="en-US" dirty="0" smtClean="0"/>
+                        <a:t>0.781</a:t>
+                      </a:r>
+                      <a:endParaRPr lang="en-US" dirty="0"/>
+                    </a:p>
+                  </a:txBody>
+                  <a:tcPr/>
+                </a:tc>
+              </a:tr>
+            </a:tbl>
+          </a:graphicData>
+        </a:graphic>
+      </p:graphicFrame>
     </p:spTree>
     <p:extLst>
       <p:ext uri="{BB962C8B-B14F-4D97-AF65-F5344CB8AC3E}">
@@ -3365,13 +3840,8 @@
           <a:p>
             <a:r>
               <a:rPr lang="en-US" dirty="0" smtClean="0"/>
-              <a:t>VM </a:t>
-            </a:r>
-            <a:r>
-              <a:rPr lang="en-US" dirty="0" smtClean="0"/>
-              <a:t>management was necessary</a:t>
-            </a:r>
-            <a:endParaRPr lang="en-US" dirty="0" smtClean="0"/>
+              <a:t>VM management was necessary</a:t>
+            </a:r>
           </a:p>
         </p:txBody>
       </p:sp>
@@ -3611,7 +4081,6 @@
               <a:rPr lang="en-US" dirty="0" smtClean="0"/>
               <a:t>76.67% positive correlation</a:t>
             </a:r>
-            <a:endParaRPr lang="en-US" dirty="0" smtClean="0"/>
           </a:p>
         </p:txBody>
       </p:sp>
@@ -4395,7 +4864,7 @@
       </p:sp>
       <p:sp>
         <p:nvSpPr>
-          <p:cNvPr id="3" name="Content Placeholder 2"/>
+          <p:cNvPr id="11" name="Content Placeholder 3"/>
           <p:cNvSpPr>
             <a:spLocks noGrp="1"/>
           </p:cNvSpPr>
@@ -4403,99 +4872,78 @@
             <p:ph idx="1"/>
           </p:nvPr>
         </p:nvSpPr>
-        <p:spPr/>
-        <p:txBody>
-          <a:bodyPr>
-            <a:scene3d>
-              <a:camera prst="orthographicFront"/>
-              <a:lightRig rig="flat" dir="tl">
-                <a:rot lat="0" lon="0" rev="6600000"/>
-              </a:lightRig>
-            </a:scene3d>
-            <a:sp3d extrusionH="25400" contourW="8890">
-              <a:bevelT w="38100" h="31750"/>
-              <a:contourClr>
-                <a:schemeClr val="accent2">
-                  <a:shade val="75000"/>
-                </a:schemeClr>
-              </a:contourClr>
-            </a:sp3d>
-          </a:bodyPr>
-          <a:lstStyle/>
-          <a:p>
-            <a:r>
-              <a:rPr lang="en-US" b="1" dirty="0" smtClean="0">
-                <a:ln w="11430"/>
-                <a:gradFill>
-                  <a:gsLst>
-                    <a:gs pos="0">
-                      <a:schemeClr val="accent2">
-                        <a:tint val="70000"/>
-                        <a:satMod val="245000"/>
-                      </a:schemeClr>
-                    </a:gs>
-                    <a:gs pos="75000">
-                      <a:schemeClr val="accent2">
-                        <a:tint val="90000"/>
-                        <a:shade val="60000"/>
-                        <a:satMod val="240000"/>
-                      </a:schemeClr>
-                    </a:gs>
-                    <a:gs pos="100000">
-                      <a:schemeClr val="accent2">
-                        <a:tint val="100000"/>
-                        <a:shade val="50000"/>
-                        <a:satMod val="240000"/>
-                      </a:schemeClr>
-                    </a:gs>
-                  </a:gsLst>
-                  <a:lin ang="5400000"/>
-                </a:gradFill>
-                <a:effectLst>
-                  <a:outerShdw blurRad="50800" dist="39000" dir="5460000" algn="tl">
-                    <a:srgbClr val="000000">
-                      <a:alpha val="38000"/>
-                    </a:srgbClr>
-                  </a:outerShdw>
-                </a:effectLst>
-              </a:rPr>
-              <a:t>PAUL! PUT SOME STUFF HERE</a:t>
-            </a:r>
-            <a:endParaRPr lang="en-US" b="1" dirty="0">
-              <a:ln w="11430"/>
-              <a:gradFill>
-                <a:gsLst>
-                  <a:gs pos="0">
-                    <a:schemeClr val="accent2">
-                      <a:tint val="70000"/>
-                      <a:satMod val="245000"/>
-                    </a:schemeClr>
-                  </a:gs>
-                  <a:gs pos="75000">
-                    <a:schemeClr val="accent2">
-                      <a:tint val="90000"/>
-                      <a:shade val="60000"/>
-                      <a:satMod val="240000"/>
-                    </a:schemeClr>
-                  </a:gs>
-                  <a:gs pos="100000">
-                    <a:schemeClr val="accent2">
-                      <a:tint val="100000"/>
-                      <a:shade val="50000"/>
-                      <a:satMod val="240000"/>
-                    </a:schemeClr>
-                  </a:gs>
-                </a:gsLst>
-                <a:lin ang="5400000"/>
-              </a:gradFill>
-              <a:effectLst>
-                <a:outerShdw blurRad="50800" dist="39000" dir="5460000" algn="tl">
-                  <a:srgbClr val="000000">
-                    <a:alpha val="38000"/>
-                  </a:srgbClr>
-                </a:outerShdw>
-              </a:effectLst>
-            </a:endParaRPr>
+        <p:spPr>
+          <a:xfrm>
+            <a:off x="457200" y="1600200"/>
+            <a:ext cx="8229600" cy="4525963"/>
+          </a:xfrm>
+        </p:spPr>
+        <p:txBody>
+          <a:bodyPr/>
+          <a:lstStyle/>
+          <a:p>
+            <a:r>
+              <a:rPr lang="en-US" dirty="0" smtClean="0"/>
+              <a:t>We obtained a CSV file from </a:t>
+            </a:r>
+            <a:r>
+              <a:rPr lang="en-US" dirty="0" err="1" smtClean="0"/>
+              <a:t>Fieran</a:t>
+            </a:r>
+            <a:r>
+              <a:rPr lang="en-US" dirty="0" smtClean="0"/>
+              <a:t> and Ryan who classified failure events into the aforementioned </a:t>
+            </a:r>
+            <a:r>
+              <a:rPr lang="en-US" dirty="0"/>
+              <a:t>categories </a:t>
+            </a:r>
+            <a:r>
+              <a:rPr lang="en-US" dirty="0" smtClean="0"/>
+              <a:t>e.g. EMR, Care Provider</a:t>
+            </a:r>
+          </a:p>
+          <a:p>
+            <a:r>
+              <a:rPr lang="en-US" dirty="0" smtClean="0"/>
+              <a:t>A Python script used FDA’s API to get the descriptions of these device failure events.</a:t>
+            </a:r>
+            <a:endParaRPr lang="en-US" dirty="0"/>
+          </a:p>
+          <a:p>
+            <a:pPr marL="0" indent="0">
+              <a:buNone/>
+            </a:pPr>
+            <a:r>
+              <a:rPr lang="en-US" dirty="0" smtClean="0"/>
+              <a:t>	https</a:t>
+            </a:r>
+            <a:r>
+              <a:rPr lang="en-US" dirty="0"/>
+              <a:t>://</a:t>
+            </a:r>
+            <a:r>
+              <a:rPr lang="en-US" dirty="0" err="1"/>
+              <a:t>api.fda.gov</a:t>
+            </a:r>
+            <a:r>
+              <a:rPr lang="en-US" dirty="0"/>
+              <a:t>/device/</a:t>
+            </a:r>
+            <a:r>
+              <a:rPr lang="en-US" dirty="0" err="1"/>
+              <a:t>event.json</a:t>
+            </a:r>
+            <a:r>
+              <a:rPr lang="en-US" dirty="0" smtClean="0"/>
+              <a:t>?</a:t>
+            </a:r>
+          </a:p>
+          <a:p>
+            <a:endParaRPr lang="en-US" dirty="0" smtClean="0"/>
+          </a:p>
+          <a:p>
+            <a:endParaRPr lang="en-US" dirty="0" smtClean="0"/>
           </a:p>
         </p:txBody>
       </p:sp>
@@ -4554,112 +5002,6 @@
       </p:sp>
       <p:sp>
         <p:nvSpPr>
-          <p:cNvPr id="3" name="Content Placeholder 2"/>
-          <p:cNvSpPr>
-            <a:spLocks noGrp="1"/>
-          </p:cNvSpPr>
-          <p:nvPr>
-            <p:ph idx="1"/>
-          </p:nvPr>
-        </p:nvSpPr>
-        <p:spPr/>
-        <p:txBody>
-          <a:bodyPr>
-            <a:scene3d>
-              <a:camera prst="orthographicFront"/>
-              <a:lightRig rig="flat" dir="tl">
-                <a:rot lat="0" lon="0" rev="6600000"/>
-              </a:lightRig>
-            </a:scene3d>
-            <a:sp3d extrusionH="25400" contourW="8890">
-              <a:bevelT w="38100" h="31750"/>
-              <a:contourClr>
-                <a:schemeClr val="accent2">
-                  <a:shade val="75000"/>
-                </a:schemeClr>
-              </a:contourClr>
-            </a:sp3d>
-          </a:bodyPr>
-          <a:lstStyle/>
-          <a:p>
-            <a:r>
-              <a:rPr lang="en-US" b="1" dirty="0" smtClean="0">
-                <a:ln w="11430"/>
-                <a:gradFill>
-                  <a:gsLst>
-                    <a:gs pos="0">
-                      <a:schemeClr val="accent2">
-                        <a:tint val="70000"/>
-                        <a:satMod val="245000"/>
-                      </a:schemeClr>
-                    </a:gs>
-                    <a:gs pos="75000">
-                      <a:schemeClr val="accent2">
-                        <a:tint val="90000"/>
-                        <a:shade val="60000"/>
-                        <a:satMod val="240000"/>
-                      </a:schemeClr>
-                    </a:gs>
-                    <a:gs pos="100000">
-                      <a:schemeClr val="accent2">
-                        <a:tint val="100000"/>
-                        <a:shade val="50000"/>
-                        <a:satMod val="240000"/>
-                      </a:schemeClr>
-                    </a:gs>
-                  </a:gsLst>
-                  <a:lin ang="5400000"/>
-                </a:gradFill>
-                <a:effectLst>
-                  <a:outerShdw blurRad="50800" dist="39000" dir="5460000" algn="tl">
-                    <a:srgbClr val="000000">
-                      <a:alpha val="38000"/>
-                    </a:srgbClr>
-                  </a:outerShdw>
-                </a:effectLst>
-              </a:rPr>
-              <a:t>PAUL! PUT SOME STUFF HERE</a:t>
-            </a:r>
-            <a:endParaRPr lang="en-US" b="1" dirty="0">
-              <a:ln w="11430"/>
-              <a:gradFill>
-                <a:gsLst>
-                  <a:gs pos="0">
-                    <a:schemeClr val="accent2">
-                      <a:tint val="70000"/>
-                      <a:satMod val="245000"/>
-                    </a:schemeClr>
-                  </a:gs>
-                  <a:gs pos="75000">
-                    <a:schemeClr val="accent2">
-                      <a:tint val="90000"/>
-                      <a:shade val="60000"/>
-                      <a:satMod val="240000"/>
-                    </a:schemeClr>
-                  </a:gs>
-                  <a:gs pos="100000">
-                    <a:schemeClr val="accent2">
-                      <a:tint val="100000"/>
-                      <a:shade val="50000"/>
-                      <a:satMod val="240000"/>
-                    </a:schemeClr>
-                  </a:gs>
-                </a:gsLst>
-                <a:lin ang="5400000"/>
-              </a:gradFill>
-              <a:effectLst>
-                <a:outerShdw blurRad="50800" dist="39000" dir="5460000" algn="tl">
-                  <a:srgbClr val="000000">
-                    <a:alpha val="38000"/>
-                  </a:srgbClr>
-                </a:outerShdw>
-              </a:effectLst>
-            </a:endParaRPr>
-          </a:p>
-        </p:txBody>
-      </p:sp>
-      <p:sp>
-        <p:nvSpPr>
           <p:cNvPr id="4" name="TextBox 3"/>
           <p:cNvSpPr txBox="1"/>
           <p:nvPr/>
@@ -4684,6 +5026,147 @@
           </a:p>
         </p:txBody>
       </p:sp>
+      <p:sp>
+        <p:nvSpPr>
+          <p:cNvPr id="8" name="Content Placeholder 2"/>
+          <p:cNvSpPr>
+            <a:spLocks noGrp="1"/>
+          </p:cNvSpPr>
+          <p:nvPr>
+            <p:ph idx="1"/>
+          </p:nvPr>
+        </p:nvSpPr>
+        <p:spPr>
+          <a:xfrm>
+            <a:off x="457199" y="1600199"/>
+            <a:ext cx="8387443" cy="4528458"/>
+          </a:xfrm>
+        </p:spPr>
+        <p:txBody>
+          <a:bodyPr>
+            <a:normAutofit fontScale="85000" lnSpcReduction="10000"/>
+          </a:bodyPr>
+          <a:lstStyle/>
+          <a:p>
+            <a:r>
+              <a:rPr lang="en-US" dirty="0"/>
+              <a:t>Given a list of </a:t>
+            </a:r>
+            <a:r>
+              <a:rPr lang="en-US" dirty="0" smtClean="0"/>
+              <a:t>failure reports</a:t>
+            </a:r>
+            <a:r>
+              <a:rPr lang="en-US" dirty="0"/>
+              <a:t>, </a:t>
+            </a:r>
+            <a:r>
+              <a:rPr lang="en-US" dirty="0" smtClean="0"/>
+              <a:t>extract </a:t>
+            </a:r>
+            <a:r>
+              <a:rPr lang="en-US" dirty="0" err="1" smtClean="0"/>
+              <a:t>mdr_text</a:t>
+            </a:r>
+            <a:r>
+              <a:rPr lang="en-US" dirty="0" smtClean="0"/>
+              <a:t>. </a:t>
+            </a:r>
+            <a:br>
+              <a:rPr lang="en-US" dirty="0" smtClean="0"/>
+            </a:br>
+            <a:r>
+              <a:rPr lang="en-US" dirty="0" smtClean="0"/>
+              <a:t>Sample </a:t>
+            </a:r>
+            <a:r>
+              <a:rPr lang="en-US" dirty="0" err="1" smtClean="0"/>
+              <a:t>mdr_text</a:t>
+            </a:r>
+            <a:r>
+              <a:rPr lang="en-US" dirty="0" smtClean="0"/>
+              <a:t>:</a:t>
+            </a:r>
+          </a:p>
+          <a:p>
+            <a:endParaRPr lang="en-US" dirty="0"/>
+          </a:p>
+          <a:p>
+            <a:endParaRPr lang="en-US" dirty="0" smtClean="0"/>
+          </a:p>
+          <a:p>
+            <a:endParaRPr lang="en-US" dirty="0"/>
+          </a:p>
+          <a:p>
+            <a:endParaRPr lang="en-US" dirty="0" smtClean="0"/>
+          </a:p>
+          <a:p>
+            <a:endParaRPr lang="en-US" dirty="0" smtClean="0"/>
+          </a:p>
+          <a:p>
+            <a:pPr marL="0" indent="0">
+              <a:buNone/>
+            </a:pPr>
+            <a:endParaRPr lang="en-US" dirty="0" smtClean="0"/>
+          </a:p>
+          <a:p>
+            <a:r>
+              <a:rPr lang="en-US" dirty="0" smtClean="0"/>
+              <a:t>Tokenize sentences and analyze part of speech. </a:t>
+            </a:r>
+          </a:p>
+          <a:p>
+            <a:r>
+              <a:rPr lang="en-US" dirty="0" smtClean="0"/>
+              <a:t>Remove </a:t>
+            </a:r>
+            <a:r>
+              <a:rPr lang="en-US" dirty="0" err="1" smtClean="0"/>
+              <a:t>stopwords</a:t>
+            </a:r>
+            <a:r>
+              <a:rPr lang="en-US" dirty="0" smtClean="0"/>
+              <a:t> (e.g. the, at, is, which) and numbers.</a:t>
+            </a:r>
+          </a:p>
+          <a:p>
+            <a:pPr marL="0" indent="0">
+              <a:buNone/>
+            </a:pPr>
+            <a:endParaRPr lang="en-US" dirty="0" smtClean="0"/>
+          </a:p>
+        </p:txBody>
+      </p:sp>
+      <p:pic>
+        <p:nvPicPr>
+          <p:cNvPr id="9" name="Picture 8" descr="Screen Shot 2015-03-23 at 6.06.51 PM.png"/>
+          <p:cNvPicPr>
+            <a:picLocks noChangeAspect="1"/>
+          </p:cNvPicPr>
+          <p:nvPr/>
+        </p:nvPicPr>
+        <p:blipFill>
+          <a:blip r:embed="rId2">
+            <a:extLst>
+              <a:ext uri="{28A0092B-C50C-407E-A947-70E740481C1C}">
+                <a14:useLocalDpi xmlns:a14="http://schemas.microsoft.com/office/drawing/2010/main" val="0"/>
+              </a:ext>
+            </a:extLst>
+          </a:blip>
+          <a:stretch>
+            <a:fillRect/>
+          </a:stretch>
+        </p:blipFill>
+        <p:spPr>
+          <a:xfrm>
+            <a:off x="299356" y="2619549"/>
+            <a:ext cx="8545286" cy="2226006"/>
+          </a:xfrm>
+          <a:prstGeom prst="rect">
+            <a:avLst/>
+          </a:prstGeom>
+        </p:spPr>
+      </p:pic>
     </p:spTree>
     <p:extLst>
       <p:ext uri="{BB962C8B-B14F-4D97-AF65-F5344CB8AC3E}">
@@ -4739,112 +5222,6 @@
       </p:sp>
       <p:sp>
         <p:nvSpPr>
-          <p:cNvPr id="3" name="Content Placeholder 2"/>
-          <p:cNvSpPr>
-            <a:spLocks noGrp="1"/>
-          </p:cNvSpPr>
-          <p:nvPr>
-            <p:ph idx="1"/>
-          </p:nvPr>
-        </p:nvSpPr>
-        <p:spPr/>
-        <p:txBody>
-          <a:bodyPr>
-            <a:scene3d>
-              <a:camera prst="orthographicFront"/>
-              <a:lightRig rig="flat" dir="tl">
-                <a:rot lat="0" lon="0" rev="6600000"/>
-              </a:lightRig>
-            </a:scene3d>
-            <a:sp3d extrusionH="25400" contourW="8890">
-              <a:bevelT w="38100" h="31750"/>
-              <a:contourClr>
-                <a:schemeClr val="accent2">
-                  <a:shade val="75000"/>
-                </a:schemeClr>
-              </a:contourClr>
-            </a:sp3d>
-          </a:bodyPr>
-          <a:lstStyle/>
-          <a:p>
-            <a:r>
-              <a:rPr lang="en-US" b="1" dirty="0" smtClean="0">
-                <a:ln w="11430"/>
-                <a:gradFill>
-                  <a:gsLst>
-                    <a:gs pos="0">
-                      <a:schemeClr val="accent2">
-                        <a:tint val="70000"/>
-                        <a:satMod val="245000"/>
-                      </a:schemeClr>
-                    </a:gs>
-                    <a:gs pos="75000">
-                      <a:schemeClr val="accent2">
-                        <a:tint val="90000"/>
-                        <a:shade val="60000"/>
-                        <a:satMod val="240000"/>
-                      </a:schemeClr>
-                    </a:gs>
-                    <a:gs pos="100000">
-                      <a:schemeClr val="accent2">
-                        <a:tint val="100000"/>
-                        <a:shade val="50000"/>
-                        <a:satMod val="240000"/>
-                      </a:schemeClr>
-                    </a:gs>
-                  </a:gsLst>
-                  <a:lin ang="5400000"/>
-                </a:gradFill>
-                <a:effectLst>
-                  <a:outerShdw blurRad="50800" dist="39000" dir="5460000" algn="tl">
-                    <a:srgbClr val="000000">
-                      <a:alpha val="38000"/>
-                    </a:srgbClr>
-                  </a:outerShdw>
-                </a:effectLst>
-              </a:rPr>
-              <a:t>PAUL! PUT SOME STUFF HERE</a:t>
-            </a:r>
-            <a:endParaRPr lang="en-US" b="1" dirty="0">
-              <a:ln w="11430"/>
-              <a:gradFill>
-                <a:gsLst>
-                  <a:gs pos="0">
-                    <a:schemeClr val="accent2">
-                      <a:tint val="70000"/>
-                      <a:satMod val="245000"/>
-                    </a:schemeClr>
-                  </a:gs>
-                  <a:gs pos="75000">
-                    <a:schemeClr val="accent2">
-                      <a:tint val="90000"/>
-                      <a:shade val="60000"/>
-                      <a:satMod val="240000"/>
-                    </a:schemeClr>
-                  </a:gs>
-                  <a:gs pos="100000">
-                    <a:schemeClr val="accent2">
-                      <a:tint val="100000"/>
-                      <a:shade val="50000"/>
-                      <a:satMod val="240000"/>
-                    </a:schemeClr>
-                  </a:gs>
-                </a:gsLst>
-                <a:lin ang="5400000"/>
-              </a:gradFill>
-              <a:effectLst>
-                <a:outerShdw blurRad="50800" dist="39000" dir="5460000" algn="tl">
-                  <a:srgbClr val="000000">
-                    <a:alpha val="38000"/>
-                  </a:srgbClr>
-                </a:outerShdw>
-              </a:effectLst>
-            </a:endParaRPr>
-          </a:p>
-        </p:txBody>
-      </p:sp>
-      <p:sp>
-        <p:nvSpPr>
           <p:cNvPr id="4" name="TextBox 3"/>
           <p:cNvSpPr txBox="1"/>
           <p:nvPr/>
@@ -4866,6 +5243,87 @@
           <a:lstStyle/>
           <a:p>
             <a:endParaRPr lang="en-US" dirty="0"/>
+          </a:p>
+        </p:txBody>
+      </p:sp>
+      <p:sp>
+        <p:nvSpPr>
+          <p:cNvPr id="6" name="Content Placeholder 4"/>
+          <p:cNvSpPr>
+            <a:spLocks noGrp="1"/>
+          </p:cNvSpPr>
+          <p:nvPr>
+            <p:ph idx="1"/>
+          </p:nvPr>
+        </p:nvSpPr>
+        <p:spPr>
+          <a:xfrm>
+            <a:off x="457200" y="1600200"/>
+            <a:ext cx="8229600" cy="4525963"/>
+          </a:xfrm>
+        </p:spPr>
+        <p:txBody>
+          <a:bodyPr/>
+          <a:lstStyle/>
+          <a:p>
+            <a:r>
+              <a:rPr lang="en-US" dirty="0" smtClean="0"/>
+              <a:t>Python script generated tuples with:</a:t>
+            </a:r>
+          </a:p>
+          <a:p>
+            <a:pPr lvl="1"/>
+            <a:r>
+              <a:rPr lang="en-US" dirty="0" smtClean="0"/>
+              <a:t>Attribute: Number of word occurrences for each word</a:t>
+            </a:r>
+          </a:p>
+          <a:p>
+            <a:pPr lvl="1"/>
+            <a:r>
+              <a:rPr lang="en-US" dirty="0" smtClean="0"/>
+              <a:t>Class: Class value from </a:t>
+            </a:r>
+            <a:r>
+              <a:rPr lang="en-US" dirty="0" err="1" smtClean="0"/>
+              <a:t>Fieran</a:t>
+            </a:r>
+            <a:r>
+              <a:rPr lang="en-US" dirty="0"/>
+              <a:t> </a:t>
+            </a:r>
+            <a:r>
+              <a:rPr lang="en-US" dirty="0" smtClean="0"/>
+              <a:t>and Ryan’s CSV file</a:t>
+            </a:r>
+          </a:p>
+          <a:p>
+            <a:r>
+              <a:rPr lang="en-US" dirty="0" smtClean="0"/>
+              <a:t>Run classification on these tuples with WEKA</a:t>
+            </a:r>
+          </a:p>
+          <a:p>
+            <a:pPr lvl="1"/>
+            <a:r>
+              <a:rPr lang="en-US" dirty="0" smtClean="0"/>
+              <a:t>10-fold cross-validation</a:t>
+            </a:r>
+          </a:p>
+          <a:p>
+            <a:pPr lvl="1"/>
+            <a:r>
+              <a:rPr lang="en-US" dirty="0" err="1" smtClean="0"/>
+              <a:t>NaiveBayes</a:t>
+            </a:r>
+            <a:r>
+              <a:rPr lang="en-US" dirty="0" smtClean="0"/>
+              <a:t> classifier</a:t>
+            </a:r>
+          </a:p>
+          <a:p>
+            <a:pPr lvl="1"/>
+            <a:endParaRPr lang="en-US" dirty="0" smtClean="0"/>
           </a:p>
         </p:txBody>
       </p:sp>

</xml_diff>

<commit_message>
added a paragraph under the Methods section.
</commit_message>
<xml_diff>
--- a/presentation/presentation.pptx
+++ b/presentation/presentation.pptx
@@ -120,7 +120,7 @@
   </p:defaultTextStyle>
   <p:extLst>
     <p:ext uri="{EFAFB233-063F-42B5-8137-9DF3F51BA10A}">
-      <p15:sldGuideLst xmlns:p15="http://schemas.microsoft.com/office/powerpoint/2012/main">
+      <p15:sldGuideLst xmlns:p15="http://schemas.microsoft.com/office/powerpoint/2012/main" xmlns="">
         <p15:guide id="1" orient="horz" pos="2160">
           <p15:clr>
             <a:srgbClr val="A4A3A4"/>
@@ -318,7 +318,7 @@
           <a:p>
             <a:fld id="{A83E17D2-DDD4-D24A-B9A3-148B5AC98B80}" type="datetimeFigureOut">
               <a:rPr lang="en-US" smtClean="0"/>
-              <a:t>3/24/15</a:t>
+              <a:t>15-03-24</a:t>
             </a:fld>
             <a:endParaRPr lang="en-US"/>
           </a:p>
@@ -488,7 +488,7 @@
           <a:p>
             <a:fld id="{A83E17D2-DDD4-D24A-B9A3-148B5AC98B80}" type="datetimeFigureOut">
               <a:rPr lang="en-US" smtClean="0"/>
-              <a:t>3/24/15</a:t>
+              <a:t>15-03-24</a:t>
             </a:fld>
             <a:endParaRPr lang="en-US"/>
           </a:p>
@@ -668,7 +668,7 @@
           <a:p>
             <a:fld id="{A83E17D2-DDD4-D24A-B9A3-148B5AC98B80}" type="datetimeFigureOut">
               <a:rPr lang="en-US" smtClean="0"/>
-              <a:t>3/24/15</a:t>
+              <a:t>15-03-24</a:t>
             </a:fld>
             <a:endParaRPr lang="en-US"/>
           </a:p>
@@ -838,7 +838,7 @@
           <a:p>
             <a:fld id="{A83E17D2-DDD4-D24A-B9A3-148B5AC98B80}" type="datetimeFigureOut">
               <a:rPr lang="en-US" smtClean="0"/>
-              <a:t>3/24/15</a:t>
+              <a:t>15-03-24</a:t>
             </a:fld>
             <a:endParaRPr lang="en-US"/>
           </a:p>
@@ -1084,7 +1084,7 @@
           <a:p>
             <a:fld id="{A83E17D2-DDD4-D24A-B9A3-148B5AC98B80}" type="datetimeFigureOut">
               <a:rPr lang="en-US" smtClean="0"/>
-              <a:t>3/24/15</a:t>
+              <a:t>15-03-24</a:t>
             </a:fld>
             <a:endParaRPr lang="en-US"/>
           </a:p>
@@ -1372,7 +1372,7 @@
           <a:p>
             <a:fld id="{A83E17D2-DDD4-D24A-B9A3-148B5AC98B80}" type="datetimeFigureOut">
               <a:rPr lang="en-US" smtClean="0"/>
-              <a:t>3/24/15</a:t>
+              <a:t>15-03-24</a:t>
             </a:fld>
             <a:endParaRPr lang="en-US"/>
           </a:p>
@@ -1794,7 +1794,7 @@
           <a:p>
             <a:fld id="{A83E17D2-DDD4-D24A-B9A3-148B5AC98B80}" type="datetimeFigureOut">
               <a:rPr lang="en-US" smtClean="0"/>
-              <a:t>3/24/15</a:t>
+              <a:t>15-03-24</a:t>
             </a:fld>
             <a:endParaRPr lang="en-US"/>
           </a:p>
@@ -1912,7 +1912,7 @@
           <a:p>
             <a:fld id="{A83E17D2-DDD4-D24A-B9A3-148B5AC98B80}" type="datetimeFigureOut">
               <a:rPr lang="en-US" smtClean="0"/>
-              <a:t>3/24/15</a:t>
+              <a:t>15-03-24</a:t>
             </a:fld>
             <a:endParaRPr lang="en-US"/>
           </a:p>
@@ -2007,7 +2007,7 @@
           <a:p>
             <a:fld id="{A83E17D2-DDD4-D24A-B9A3-148B5AC98B80}" type="datetimeFigureOut">
               <a:rPr lang="en-US" smtClean="0"/>
-              <a:t>3/24/15</a:t>
+              <a:t>15-03-24</a:t>
             </a:fld>
             <a:endParaRPr lang="en-US"/>
           </a:p>
@@ -2284,7 +2284,7 @@
           <a:p>
             <a:fld id="{A83E17D2-DDD4-D24A-B9A3-148B5AC98B80}" type="datetimeFigureOut">
               <a:rPr lang="en-US" smtClean="0"/>
-              <a:t>3/24/15</a:t>
+              <a:t>15-03-24</a:t>
             </a:fld>
             <a:endParaRPr lang="en-US"/>
           </a:p>
@@ -2537,7 +2537,7 @@
           <a:p>
             <a:fld id="{A83E17D2-DDD4-D24A-B9A3-148B5AC98B80}" type="datetimeFigureOut">
               <a:rPr lang="en-US" smtClean="0"/>
-              <a:t>3/24/15</a:t>
+              <a:t>15-03-24</a:t>
             </a:fld>
             <a:endParaRPr lang="en-US"/>
           </a:p>
@@ -2750,7 +2750,7 @@
           <a:p>
             <a:fld id="{A83E17D2-DDD4-D24A-B9A3-148B5AC98B80}" type="datetimeFigureOut">
               <a:rPr lang="en-US" smtClean="0"/>
-              <a:t>3/24/15</a:t>
+              <a:t>15-03-24</a:t>
             </a:fld>
             <a:endParaRPr lang="en-US"/>
           </a:p>
@@ -3224,7 +3224,7 @@
   <p:timing>
     <p:tnLst>
       <p:par>
-        <p:cTn id="1" dur="indefinite" restart="never" nodeType="tmRoot"/>
+        <p:cTn xmlns:p14="http://schemas.microsoft.com/office/powerpoint/2010/main" id="1" dur="indefinite" restart="never" nodeType="tmRoot"/>
       </p:par>
     </p:tnLst>
   </p:timing>
@@ -3774,7 +3774,7 @@
   <p:timing>
     <p:tnLst>
       <p:par>
-        <p:cTn id="1" dur="indefinite" restart="never" nodeType="tmRoot"/>
+        <p:cTn xmlns:p14="http://schemas.microsoft.com/office/powerpoint/2010/main" id="1" dur="indefinite" restart="never" nodeType="tmRoot"/>
       </p:par>
     </p:tnLst>
   </p:timing>
@@ -3865,7 +3865,6 @@
               <a:rPr lang="en-US" dirty="0" smtClean="0"/>
               <a:t>Data downloaded in chunks and merged after</a:t>
             </a:r>
-            <a:endParaRPr lang="en-US" dirty="0" smtClean="0"/>
           </a:p>
         </p:txBody>
       </p:sp>
@@ -3882,7 +3881,7 @@
   <p:timing>
     <p:tnLst>
       <p:par>
-        <p:cTn id="1" dur="indefinite" restart="never" nodeType="tmRoot"/>
+        <p:cTn xmlns:p14="http://schemas.microsoft.com/office/powerpoint/2010/main" id="1" dur="indefinite" restart="never" nodeType="tmRoot"/>
       </p:par>
     </p:tnLst>
   </p:timing>
@@ -3972,11 +3971,7 @@
           <a:p>
             <a:r>
               <a:rPr lang="en-US" dirty="0" smtClean="0"/>
-              <a:t>Selected 5 major metadata attributes to classify data </a:t>
-            </a:r>
-            <a:r>
-              <a:rPr lang="en-US" dirty="0" smtClean="0"/>
-              <a:t>on</a:t>
+              <a:t>Selected 5 major metadata attributes to classify data on</a:t>
             </a:r>
           </a:p>
           <a:p>
@@ -4055,7 +4050,7 @@
   <p:timing>
     <p:tnLst>
       <p:par>
-        <p:cTn id="1" dur="indefinite" restart="never" nodeType="tmRoot"/>
+        <p:cTn xmlns:p14="http://schemas.microsoft.com/office/powerpoint/2010/main" id="1" dur="indefinite" restart="never" nodeType="tmRoot"/>
       </p:par>
     </p:tnLst>
   </p:timing>
@@ -4169,15 +4164,7 @@
             <a:pPr lvl="1"/>
             <a:r>
               <a:rPr lang="en-US" dirty="0" smtClean="0"/>
-              <a:t>76.67</a:t>
-            </a:r>
-            <a:r>
-              <a:rPr lang="en-US" dirty="0" smtClean="0"/>
-              <a:t>% positive </a:t>
-            </a:r>
-            <a:r>
-              <a:rPr lang="en-US" dirty="0" smtClean="0"/>
-              <a:t>correlation</a:t>
+              <a:t>76.67% positive correlation</a:t>
             </a:r>
           </a:p>
           <a:p>
@@ -4186,7 +4173,6 @@
               <a:rPr lang="en-US" dirty="0" smtClean="0"/>
               <a:t>0.764 F-Measure (Weighted Average)</a:t>
             </a:r>
-            <a:endParaRPr lang="en-US" dirty="0" smtClean="0"/>
           </a:p>
         </p:txBody>
       </p:sp>
@@ -4375,7 +4361,7 @@
   <p:timing>
     <p:tnLst>
       <p:par>
-        <p:cTn id="1" dur="indefinite" restart="never" nodeType="tmRoot"/>
+        <p:cTn xmlns:p14="http://schemas.microsoft.com/office/powerpoint/2010/main" id="1" dur="indefinite" restart="never" nodeType="tmRoot"/>
       </p:par>
     </p:tnLst>
   </p:timing>
@@ -4451,15 +4437,7 @@
             </a:r>
             <a:r>
               <a:rPr lang="en-US" dirty="0" smtClean="0"/>
-              <a:t>ser </a:t>
-            </a:r>
-            <a:r>
-              <a:rPr lang="en-US" b="1" dirty="0" smtClean="0"/>
-              <a:t>F</a:t>
-            </a:r>
-            <a:r>
-              <a:rPr lang="en-US" dirty="0" smtClean="0"/>
-              <a:t>acility </a:t>
+              <a:t>ser Facility </a:t>
             </a:r>
             <a:r>
               <a:rPr lang="en-US" b="1" dirty="0" smtClean="0"/>
@@ -4525,7 +4503,7 @@
   <p:timing>
     <p:tnLst>
       <p:par>
-        <p:cTn id="1" dur="indefinite" restart="never" nodeType="tmRoot"/>
+        <p:cTn xmlns:p14="http://schemas.microsoft.com/office/powerpoint/2010/main" id="1" dur="indefinite" restart="never" nodeType="tmRoot"/>
       </p:par>
     </p:tnLst>
   </p:timing>
@@ -4654,7 +4632,7 @@
   <p:timing>
     <p:tnLst>
       <p:par>
-        <p:cTn id="1" dur="indefinite" restart="never" nodeType="tmRoot"/>
+        <p:cTn xmlns:p14="http://schemas.microsoft.com/office/powerpoint/2010/main" id="1" dur="indefinite" restart="never" nodeType="tmRoot"/>
       </p:par>
     </p:tnLst>
   </p:timing>
@@ -4791,7 +4769,7 @@
   <p:timing>
     <p:tnLst>
       <p:par>
-        <p:cTn id="1" dur="indefinite" restart="never" nodeType="tmRoot"/>
+        <p:cTn xmlns:p14="http://schemas.microsoft.com/office/powerpoint/2010/main" id="1" dur="indefinite" restart="never" nodeType="tmRoot"/>
       </p:par>
     </p:tnLst>
   </p:timing>
@@ -4940,7 +4918,7 @@
   <p:timing>
     <p:tnLst>
       <p:par>
-        <p:cTn id="1" dur="indefinite" restart="never" nodeType="tmRoot"/>
+        <p:cTn xmlns:p14="http://schemas.microsoft.com/office/powerpoint/2010/main" id="1" dur="indefinite" restart="never" nodeType="tmRoot"/>
       </p:par>
     </p:tnLst>
   </p:timing>
@@ -5029,7 +5007,7 @@
   <p:timing>
     <p:tnLst>
       <p:par>
-        <p:cTn id="1" dur="indefinite" restart="never" nodeType="tmRoot"/>
+        <p:cTn xmlns:p14="http://schemas.microsoft.com/office/powerpoint/2010/main" id="1" dur="indefinite" restart="never" nodeType="tmRoot"/>
       </p:par>
     </p:tnLst>
   </p:timing>
@@ -5174,7 +5152,7 @@
   <p:timing>
     <p:tnLst>
       <p:par>
-        <p:cTn id="1" dur="indefinite" restart="never" nodeType="tmRoot"/>
+        <p:cTn xmlns:p14="http://schemas.microsoft.com/office/powerpoint/2010/main" id="1" dur="indefinite" restart="never" nodeType="tmRoot"/>
       </p:par>
     </p:tnLst>
   </p:timing>
@@ -5401,7 +5379,7 @@
   <p:timing>
     <p:tnLst>
       <p:par>
-        <p:cTn id="1" dur="indefinite" restart="never" nodeType="tmRoot"/>
+        <p:cTn xmlns:p14="http://schemas.microsoft.com/office/powerpoint/2010/main" id="1" dur="indefinite" restart="never" nodeType="tmRoot"/>
       </p:par>
     </p:tnLst>
   </p:timing>
@@ -5568,7 +5546,7 @@
   <p:timing>
     <p:tnLst>
       <p:par>
-        <p:cTn id="1" dur="indefinite" restart="never" nodeType="tmRoot"/>
+        <p:cTn xmlns:p14="http://schemas.microsoft.com/office/powerpoint/2010/main" id="1" dur="indefinite" restart="never" nodeType="tmRoot"/>
       </p:par>
     </p:tnLst>
   </p:timing>

</xml_diff>